<commit_message>
Get category names from Amazone
</commit_message>
<xml_diff>
--- a/PriceMoinitoringDesign.pptx
+++ b/PriceMoinitoringDesign.pptx
@@ -204,7 +204,7 @@
           <a:p>
             <a:fld id="{822F189D-D7C4-2B4B-BA7D-F542C8765D31}" type="datetimeFigureOut">
               <a:rPr lang="en-US" smtClean="0"/>
-              <a:t>5/27/17</a:t>
+              <a:t>5/30/17</a:t>
             </a:fld>
             <a:endParaRPr lang="en-US"/>
           </a:p>
@@ -603,7 +603,7 @@
           <a:p>
             <a:fld id="{FE13B3C1-B50E-B844-B5EC-A0E6C3AA92EA}" type="datetimeFigureOut">
               <a:rPr lang="en-US" smtClean="0"/>
-              <a:t>5/27/17</a:t>
+              <a:t>5/30/17</a:t>
             </a:fld>
             <a:endParaRPr lang="en-US"/>
           </a:p>
@@ -773,7 +773,7 @@
           <a:p>
             <a:fld id="{FE13B3C1-B50E-B844-B5EC-A0E6C3AA92EA}" type="datetimeFigureOut">
               <a:rPr lang="en-US" smtClean="0"/>
-              <a:t>5/27/17</a:t>
+              <a:t>5/30/17</a:t>
             </a:fld>
             <a:endParaRPr lang="en-US"/>
           </a:p>
@@ -953,7 +953,7 @@
           <a:p>
             <a:fld id="{FE13B3C1-B50E-B844-B5EC-A0E6C3AA92EA}" type="datetimeFigureOut">
               <a:rPr lang="en-US" smtClean="0"/>
-              <a:t>5/27/17</a:t>
+              <a:t>5/30/17</a:t>
             </a:fld>
             <a:endParaRPr lang="en-US"/>
           </a:p>
@@ -1123,7 +1123,7 @@
           <a:p>
             <a:fld id="{FE13B3C1-B50E-B844-B5EC-A0E6C3AA92EA}" type="datetimeFigureOut">
               <a:rPr lang="en-US" smtClean="0"/>
-              <a:t>5/27/17</a:t>
+              <a:t>5/30/17</a:t>
             </a:fld>
             <a:endParaRPr lang="en-US"/>
           </a:p>
@@ -1369,7 +1369,7 @@
           <a:p>
             <a:fld id="{FE13B3C1-B50E-B844-B5EC-A0E6C3AA92EA}" type="datetimeFigureOut">
               <a:rPr lang="en-US" smtClean="0"/>
-              <a:t>5/27/17</a:t>
+              <a:t>5/30/17</a:t>
             </a:fld>
             <a:endParaRPr lang="en-US"/>
           </a:p>
@@ -1601,7 +1601,7 @@
           <a:p>
             <a:fld id="{FE13B3C1-B50E-B844-B5EC-A0E6C3AA92EA}" type="datetimeFigureOut">
               <a:rPr lang="en-US" smtClean="0"/>
-              <a:t>5/27/17</a:t>
+              <a:t>5/30/17</a:t>
             </a:fld>
             <a:endParaRPr lang="en-US"/>
           </a:p>
@@ -1968,7 +1968,7 @@
           <a:p>
             <a:fld id="{FE13B3C1-B50E-B844-B5EC-A0E6C3AA92EA}" type="datetimeFigureOut">
               <a:rPr lang="en-US" smtClean="0"/>
-              <a:t>5/27/17</a:t>
+              <a:t>5/30/17</a:t>
             </a:fld>
             <a:endParaRPr lang="en-US"/>
           </a:p>
@@ -2086,7 +2086,7 @@
           <a:p>
             <a:fld id="{FE13B3C1-B50E-B844-B5EC-A0E6C3AA92EA}" type="datetimeFigureOut">
               <a:rPr lang="en-US" smtClean="0"/>
-              <a:t>5/27/17</a:t>
+              <a:t>5/30/17</a:t>
             </a:fld>
             <a:endParaRPr lang="en-US"/>
           </a:p>
@@ -2181,7 +2181,7 @@
           <a:p>
             <a:fld id="{FE13B3C1-B50E-B844-B5EC-A0E6C3AA92EA}" type="datetimeFigureOut">
               <a:rPr lang="en-US" smtClean="0"/>
-              <a:t>5/27/17</a:t>
+              <a:t>5/30/17</a:t>
             </a:fld>
             <a:endParaRPr lang="en-US"/>
           </a:p>
@@ -2458,7 +2458,7 @@
           <a:p>
             <a:fld id="{FE13B3C1-B50E-B844-B5EC-A0E6C3AA92EA}" type="datetimeFigureOut">
               <a:rPr lang="en-US" smtClean="0"/>
-              <a:t>5/27/17</a:t>
+              <a:t>5/30/17</a:t>
             </a:fld>
             <a:endParaRPr lang="en-US"/>
           </a:p>
@@ -2711,7 +2711,7 @@
           <a:p>
             <a:fld id="{FE13B3C1-B50E-B844-B5EC-A0E6C3AA92EA}" type="datetimeFigureOut">
               <a:rPr lang="en-US" smtClean="0"/>
-              <a:t>5/27/17</a:t>
+              <a:t>5/30/17</a:t>
             </a:fld>
             <a:endParaRPr lang="en-US"/>
           </a:p>
@@ -2924,7 +2924,7 @@
           <a:p>
             <a:fld id="{FE13B3C1-B50E-B844-B5EC-A0E6C3AA92EA}" type="datetimeFigureOut">
               <a:rPr lang="en-US" smtClean="0"/>
-              <a:t>5/27/17</a:t>
+              <a:t>5/30/17</a:t>
             </a:fld>
             <a:endParaRPr lang="en-US"/>
           </a:p>
@@ -3353,15 +3353,7 @@
           <a:p>
             <a:r>
               <a:rPr lang="en-US" dirty="0" smtClean="0"/>
-              <a:t>Category </a:t>
-            </a:r>
-            <a:r>
-              <a:rPr lang="en-US" dirty="0" smtClean="0"/>
-              <a:t>Crawling </a:t>
-            </a:r>
-            <a:r>
-              <a:rPr lang="en-US" dirty="0" smtClean="0"/>
-              <a:t>Flow</a:t>
+              <a:t>Category Crawling Flow</a:t>
             </a:r>
             <a:endParaRPr lang="en-US" dirty="0"/>
           </a:p>
@@ -4355,11 +4347,7 @@
             </a:r>
             <a:r>
               <a:rPr lang="en-US" dirty="0" smtClean="0"/>
-              <a:t>, </a:t>
-            </a:r>
-            <a:r>
-              <a:rPr lang="en-US" dirty="0" smtClean="0"/>
-              <a:t>title, </a:t>
+              <a:t>, title, </a:t>
             </a:r>
             <a:r>
               <a:rPr lang="en-US" dirty="0" err="1" smtClean="0"/>
@@ -6521,16 +6509,24 @@
               <a:t>: </a:t>
             </a:r>
             <a:r>
-              <a:rPr lang="en-US" dirty="0">
-                <a:hlinkClick r:id="rId2"/>
-              </a:rPr>
-              <a:t>https://www.amazon.com</a:t>
-            </a:r>
-            <a:r>
-              <a:rPr lang="en-US" dirty="0" smtClean="0">
-                <a:hlinkClick r:id="rId2"/>
-              </a:rPr>
-              <a:t>/</a:t>
+              <a:rPr lang="en-US" dirty="0"/>
+              <a:t>https://</a:t>
+            </a:r>
+            <a:r>
+              <a:rPr lang="en-US" dirty="0" err="1"/>
+              <a:t>www.amazon.com</a:t>
+            </a:r>
+            <a:r>
+              <a:rPr lang="en-US" dirty="0"/>
+              <a:t>/s/ref=nb_sb_noss_2?url=search-alias=</a:t>
+            </a:r>
+            <a:r>
+              <a:rPr lang="en-US" dirty="0" err="1"/>
+              <a:t>aps&amp;field-keywords</a:t>
+            </a:r>
+            <a:r>
+              <a:rPr lang="en-US" dirty="0"/>
+              <a:t>=-12345</a:t>
             </a:r>
             <a:endParaRPr lang="en-US" dirty="0" smtClean="0"/>
           </a:p>

</xml_diff>